<commit_message>
Update gitbook 2024-09-04 21:42:59
</commit_message>
<xml_diff>
--- a/ArrowFunctions/ArrowFunctions.pptx
+++ b/ArrowFunctions/ArrowFunctions.pptx
@@ -270,7 +270,7 @@
           <a:p>
             <a:fld id="{9A92162D-6038-427F-BCEA-FF9B4FE495F0}" type="datetimeFigureOut">
               <a:rPr lang="en-US" smtClean="0"/>
-              <a:t>2/15/2023</a:t>
+              <a:t>9/4/2024</a:t>
             </a:fld>
             <a:endParaRPr lang="en-US"/>
           </a:p>
@@ -447,7 +447,7 @@
           <a:p>
             <a:fld id="{A9A067D9-116D-3843-ABDF-D6546C1962D4}" type="datetimeFigureOut">
               <a:rPr lang="en-US" smtClean="0"/>
-              <a:t>2/15/2023</a:t>
+              <a:t>9/4/2024</a:t>
             </a:fld>
             <a:endParaRPr lang="en-US" dirty="0"/>
           </a:p>
@@ -29745,7 +29745,9 @@
             <a:r>
               <a:rPr lang="en-US" sz="9600" dirty="0">
                 <a:solidFill>
-                  <a:srgbClr val="FCE100"/>
+                  <a:schemeClr val="accent5">
+                    <a:lumMod val="75000"/>
+                  </a:schemeClr>
                 </a:solidFill>
                 <a:hlinkClick r:id="rId3">
                   <a:extLst>
@@ -29755,41 +29757,13 @@
                   </a:extLst>
                 </a:hlinkClick>
               </a:rPr>
-              <a:t>https://replit.com/</a:t>
-            </a:r>
-            <a:r>
-              <a:rPr lang="en-US" sz="8800" dirty="0">
-                <a:solidFill>
-                  <a:srgbClr val="FCE100"/>
-                </a:solidFill>
-                <a:hlinkClick r:id="rId3">
-                  <a:extLst>
-                    <a:ext uri="{A12FA001-AC4F-418D-AE19-62706E023703}">
-                      <ahyp:hlinkClr xmlns:ahyp="http://schemas.microsoft.com/office/drawing/2018/hyperlinkcolor" val="tx"/>
-                    </a:ext>
-                  </a:extLst>
-                </a:hlinkClick>
-              </a:rPr>
-              <a:t>@</a:t>
-            </a:r>
-            <a:r>
-              <a:rPr lang="en-US" sz="9600" dirty="0">
-                <a:solidFill>
-                  <a:srgbClr val="FCE100"/>
-                </a:solidFill>
-                <a:hlinkClick r:id="rId3">
-                  <a:extLst>
-                    <a:ext uri="{A12FA001-AC4F-418D-AE19-62706E023703}">
-                      <ahyp:hlinkClr xmlns:ahyp="http://schemas.microsoft.com/office/drawing/2018/hyperlinkcolor" val="tx"/>
-                    </a:ext>
-                  </a:extLst>
-                </a:hlinkClick>
-              </a:rPr>
-              <a:t>HylandOutreach/ArrowFun</a:t>
+              <a:t>https://jsfiddle.net/07ksmx2p/</a:t>
             </a:r>
             <a:endParaRPr lang="en-US" sz="9600" dirty="0">
               <a:solidFill>
-                <a:srgbClr val="FCE100"/>
+                <a:schemeClr val="accent5">
+                  <a:lumMod val="75000"/>
+                </a:schemeClr>
               </a:solidFill>
             </a:endParaRPr>
           </a:p>
@@ -37578,15 +37552,6 @@
 </file>
 
 <file path=customXml/item2.xml><?xml version="1.0" encoding="utf-8"?>
-<?mso-contentType ?>
-<FormTemplates xmlns="http://schemas.microsoft.com/sharepoint/v3/contenttype/forms">
-  <Display>DocumentLibraryForm</Display>
-  <Edit>DocumentLibraryForm</Edit>
-  <New>DocumentLibraryForm</New>
-</FormTemplates>
-</file>
-
-<file path=customXml/item3.xml><?xml version="1.0" encoding="utf-8"?>
 <ct:contentTypeSchema xmlns:ct="http://schemas.microsoft.com/office/2006/metadata/contentType" xmlns:ma="http://schemas.microsoft.com/office/2006/metadata/properties/metaAttributes" ct:_="" ma:_="" ma:contentTypeName="Document" ma:contentTypeID="0x01010079F111ED35F8CC479449609E8A0923A6" ma:contentTypeVersion="25" ma:contentTypeDescription="Create a new document." ma:contentTypeScope="" ma:versionID="e02306daf00165b375dc6a58966960be">
   <xsd:schema xmlns:xsd="http://www.w3.org/2001/XMLSchema" xmlns:xs="http://www.w3.org/2001/XMLSchema" xmlns:p="http://schemas.microsoft.com/office/2006/metadata/properties" xmlns:ns1="http://schemas.microsoft.com/sharepoint/v3" xmlns:ns2="71af3243-3dd4-4a8d-8c0d-dd76da1f02a5" xmlns:ns3="16c05727-aa75-4e4a-9b5f-8a80a1165891" xmlns:ns4="230e9df3-be65-4c73-a93b-d1236ebd677e" targetNamespace="http://schemas.microsoft.com/office/2006/metadata/properties" ma:root="true" ma:fieldsID="df88fb76bf5f555224557953949c1ec9" ns1:_="" ns2:_="" ns3:_="" ns4:_="">
     <xsd:import namespace="http://schemas.microsoft.com/sharepoint/v3"/>
@@ -37880,6 +37845,15 @@
 </ct:contentTypeSchema>
 </file>
 
+<file path=customXml/item3.xml><?xml version="1.0" encoding="utf-8"?>
+<?mso-contentType ?>
+<FormTemplates xmlns="http://schemas.microsoft.com/sharepoint/v3/contenttype/forms">
+  <Display>DocumentLibraryForm</Display>
+  <Edit>DocumentLibraryForm</Edit>
+  <New>DocumentLibraryForm</New>
+</FormTemplates>
+</file>
+
 <file path=customXml/itemProps1.xml><?xml version="1.0" encoding="utf-8"?>
 <ds:datastoreItem xmlns:ds="http://schemas.openxmlformats.org/officeDocument/2006/customXml" ds:itemID="{3065A588-1D2A-427C-AA32-A236D95C8F89}">
   <ds:schemaRefs>
@@ -37900,14 +37874,6 @@
 </file>
 
 <file path=customXml/itemProps2.xml><?xml version="1.0" encoding="utf-8"?>
-<ds:datastoreItem xmlns:ds="http://schemas.openxmlformats.org/officeDocument/2006/customXml" ds:itemID="{83441F37-C10B-49C7-9131-D813AD6E9480}">
-  <ds:schemaRefs>
-    <ds:schemaRef ds:uri="http://schemas.microsoft.com/sharepoint/v3/contenttype/forms"/>
-  </ds:schemaRefs>
-</ds:datastoreItem>
-</file>
-
-<file path=customXml/itemProps3.xml><?xml version="1.0" encoding="utf-8"?>
 <ds:datastoreItem xmlns:ds="http://schemas.openxmlformats.org/officeDocument/2006/customXml" ds:itemID="{4FB0F111-FD6B-4279-A9B8-A9ADF2774655}">
   <ds:schemaRefs>
     <ds:schemaRef ds:uri="http://schemas.microsoft.com/office/2006/metadata/contentType"/>
@@ -37928,6 +37894,14 @@
 </ds:datastoreItem>
 </file>
 
+<file path=customXml/itemProps3.xml><?xml version="1.0" encoding="utf-8"?>
+<ds:datastoreItem xmlns:ds="http://schemas.openxmlformats.org/officeDocument/2006/customXml" ds:itemID="{83441F37-C10B-49C7-9131-D813AD6E9480}">
+  <ds:schemaRefs>
+    <ds:schemaRef ds:uri="http://schemas.microsoft.com/sharepoint/v3/contenttype/forms"/>
+  </ds:schemaRefs>
+</ds:datastoreItem>
+</file>
+
 <file path=docMetadata/LabelInfo.xml><?xml version="1.0" encoding="utf-8"?>
 <clbl:labelList xmlns:clbl="http://schemas.microsoft.com/office/2020/mipLabelMetadata"/>
 </file>
</xml_diff>